<commit_message>
First cut at "requirements"
</commit_message>
<xml_diff>
--- a/WhitePaper/Semantic Healthcare Paper Diagrams.pptx
+++ b/WhitePaper/Semantic Healthcare Paper Diagrams.pptx
@@ -10,6 +10,7 @@
     <p:sldId id="260" r:id="rId4"/>
     <p:sldId id="261" r:id="rId5"/>
     <p:sldId id="262" r:id="rId6"/>
+    <p:sldId id="263" r:id="rId7"/>
   </p:sldIdLst>
   <p:sldSz cx="6858000" cy="9144000" type="letter"/>
   <p:notesSz cx="6858000" cy="9144000"/>
@@ -247,7 +248,7 @@
           <a:p>
             <a:fld id="{D49B33F5-9DE1-47A5-B0F3-0B544D1A8CD0}" type="datetimeFigureOut">
               <a:rPr lang="en-US" smtClean="0"/>
-              <a:t>2/25/2022</a:t>
+              <a:t>3/12/2022</a:t>
             </a:fld>
             <a:endParaRPr lang="en-US"/>
           </a:p>
@@ -417,7 +418,7 @@
           <a:p>
             <a:fld id="{D49B33F5-9DE1-47A5-B0F3-0B544D1A8CD0}" type="datetimeFigureOut">
               <a:rPr lang="en-US" smtClean="0"/>
-              <a:t>2/25/2022</a:t>
+              <a:t>3/12/2022</a:t>
             </a:fld>
             <a:endParaRPr lang="en-US"/>
           </a:p>
@@ -597,7 +598,7 @@
           <a:p>
             <a:fld id="{D49B33F5-9DE1-47A5-B0F3-0B544D1A8CD0}" type="datetimeFigureOut">
               <a:rPr lang="en-US" smtClean="0"/>
-              <a:t>2/25/2022</a:t>
+              <a:t>3/12/2022</a:t>
             </a:fld>
             <a:endParaRPr lang="en-US"/>
           </a:p>
@@ -767,7 +768,7 @@
           <a:p>
             <a:fld id="{D49B33F5-9DE1-47A5-B0F3-0B544D1A8CD0}" type="datetimeFigureOut">
               <a:rPr lang="en-US" smtClean="0"/>
-              <a:t>2/25/2022</a:t>
+              <a:t>3/12/2022</a:t>
             </a:fld>
             <a:endParaRPr lang="en-US"/>
           </a:p>
@@ -1011,7 +1012,7 @@
           <a:p>
             <a:fld id="{D49B33F5-9DE1-47A5-B0F3-0B544D1A8CD0}" type="datetimeFigureOut">
               <a:rPr lang="en-US" smtClean="0"/>
-              <a:t>2/25/2022</a:t>
+              <a:t>3/12/2022</a:t>
             </a:fld>
             <a:endParaRPr lang="en-US"/>
           </a:p>
@@ -1243,7 +1244,7 @@
           <a:p>
             <a:fld id="{D49B33F5-9DE1-47A5-B0F3-0B544D1A8CD0}" type="datetimeFigureOut">
               <a:rPr lang="en-US" smtClean="0"/>
-              <a:t>2/25/2022</a:t>
+              <a:t>3/12/2022</a:t>
             </a:fld>
             <a:endParaRPr lang="en-US"/>
           </a:p>
@@ -1610,7 +1611,7 @@
           <a:p>
             <a:fld id="{D49B33F5-9DE1-47A5-B0F3-0B544D1A8CD0}" type="datetimeFigureOut">
               <a:rPr lang="en-US" smtClean="0"/>
-              <a:t>2/25/2022</a:t>
+              <a:t>3/12/2022</a:t>
             </a:fld>
             <a:endParaRPr lang="en-US"/>
           </a:p>
@@ -1728,7 +1729,7 @@
           <a:p>
             <a:fld id="{D49B33F5-9DE1-47A5-B0F3-0B544D1A8CD0}" type="datetimeFigureOut">
               <a:rPr lang="en-US" smtClean="0"/>
-              <a:t>2/25/2022</a:t>
+              <a:t>3/12/2022</a:t>
             </a:fld>
             <a:endParaRPr lang="en-US"/>
           </a:p>
@@ -1823,7 +1824,7 @@
           <a:p>
             <a:fld id="{D49B33F5-9DE1-47A5-B0F3-0B544D1A8CD0}" type="datetimeFigureOut">
               <a:rPr lang="en-US" smtClean="0"/>
-              <a:t>2/25/2022</a:t>
+              <a:t>3/12/2022</a:t>
             </a:fld>
             <a:endParaRPr lang="en-US"/>
           </a:p>
@@ -2100,7 +2101,7 @@
           <a:p>
             <a:fld id="{D49B33F5-9DE1-47A5-B0F3-0B544D1A8CD0}" type="datetimeFigureOut">
               <a:rPr lang="en-US" smtClean="0"/>
-              <a:t>2/25/2022</a:t>
+              <a:t>3/12/2022</a:t>
             </a:fld>
             <a:endParaRPr lang="en-US"/>
           </a:p>
@@ -2357,7 +2358,7 @@
           <a:p>
             <a:fld id="{D49B33F5-9DE1-47A5-B0F3-0B544D1A8CD0}" type="datetimeFigureOut">
               <a:rPr lang="en-US" smtClean="0"/>
-              <a:t>2/25/2022</a:t>
+              <a:t>3/12/2022</a:t>
             </a:fld>
             <a:endParaRPr lang="en-US"/>
           </a:p>
@@ -2570,7 +2571,7 @@
           <a:p>
             <a:fld id="{D49B33F5-9DE1-47A5-B0F3-0B544D1A8CD0}" type="datetimeFigureOut">
               <a:rPr lang="en-US" smtClean="0"/>
-              <a:t>2/25/2022</a:t>
+              <a:t>3/12/2022</a:t>
             </a:fld>
             <a:endParaRPr lang="en-US"/>
           </a:p>
@@ -6003,6 +6004,142 @@
 </p:sld>
 </file>
 
+<file path=ppt/slides/slide6.xml><?xml version="1.0" encoding="utf-8"?>
+<p:sld xmlns:a="http://schemas.openxmlformats.org/drawingml/2006/main" xmlns:r="http://schemas.openxmlformats.org/officeDocument/2006/relationships" xmlns:p="http://schemas.openxmlformats.org/presentationml/2006/main">
+  <p:cSld>
+    <p:spTree>
+      <p:nvGrpSpPr>
+        <p:cNvPr id="1" name=""/>
+        <p:cNvGrpSpPr/>
+        <p:nvPr/>
+      </p:nvGrpSpPr>
+      <p:grpSpPr>
+        <a:xfrm>
+          <a:off x="0" y="0"/>
+          <a:ext cx="0" cy="0"/>
+          <a:chOff x="0" y="0"/>
+          <a:chExt cx="0" cy="0"/>
+        </a:xfrm>
+      </p:grpSpPr>
+      <p:pic>
+        <p:nvPicPr>
+          <p:cNvPr id="19" name="Picture 18">
+            <a:extLst>
+              <a:ext uri="{FF2B5EF4-FFF2-40B4-BE49-F238E27FC236}">
+                <a16:creationId xmlns:a16="http://schemas.microsoft.com/office/drawing/2014/main" id="{2413D34C-50A1-40A6-85D2-3725F0DC81D5}"/>
+              </a:ext>
+            </a:extLst>
+          </p:cNvPr>
+          <p:cNvPicPr>
+            <a:picLocks noChangeAspect="1"/>
+          </p:cNvPicPr>
+          <p:nvPr/>
+        </p:nvPicPr>
+        <p:blipFill>
+          <a:blip r:embed="rId2"/>
+          <a:stretch>
+            <a:fillRect/>
+          </a:stretch>
+        </p:blipFill>
+        <p:spPr>
+          <a:xfrm>
+            <a:off x="103486" y="2527207"/>
+            <a:ext cx="2730572" cy="1774206"/>
+          </a:xfrm>
+          <a:prstGeom prst="rect">
+            <a:avLst/>
+          </a:prstGeom>
+        </p:spPr>
+      </p:pic>
+      <p:pic>
+        <p:nvPicPr>
+          <p:cNvPr id="20" name="image9.png">
+            <a:extLst>
+              <a:ext uri="{FF2B5EF4-FFF2-40B4-BE49-F238E27FC236}">
+                <a16:creationId xmlns:a16="http://schemas.microsoft.com/office/drawing/2014/main" id="{DE972323-8882-4ABB-B3A6-EE1594A51BE1}"/>
+              </a:ext>
+            </a:extLst>
+          </p:cNvPr>
+          <p:cNvPicPr/>
+          <p:nvPr/>
+        </p:nvPicPr>
+        <p:blipFill>
+          <a:blip r:embed="rId3"/>
+          <a:srcRect/>
+          <a:stretch>
+            <a:fillRect/>
+          </a:stretch>
+        </p:blipFill>
+        <p:spPr>
+          <a:xfrm>
+            <a:off x="3446127" y="2449903"/>
+            <a:ext cx="2898689" cy="2271387"/>
+          </a:xfrm>
+          <a:prstGeom prst="rect">
+            <a:avLst/>
+          </a:prstGeom>
+          <a:ln/>
+        </p:spPr>
+      </p:pic>
+      <p:sp>
+        <p:nvSpPr>
+          <p:cNvPr id="21" name="Arrow: Right 20">
+            <a:extLst>
+              <a:ext uri="{FF2B5EF4-FFF2-40B4-BE49-F238E27FC236}">
+                <a16:creationId xmlns:a16="http://schemas.microsoft.com/office/drawing/2014/main" id="{89324D2A-0449-47F4-85F9-7100488E31F0}"/>
+              </a:ext>
+            </a:extLst>
+          </p:cNvPr>
+          <p:cNvSpPr/>
+          <p:nvPr/>
+        </p:nvSpPr>
+        <p:spPr>
+          <a:xfrm>
+            <a:off x="2834058" y="3135086"/>
+            <a:ext cx="577817" cy="690465"/>
+          </a:xfrm>
+          <a:prstGeom prst="rightArrow">
+            <a:avLst/>
+          </a:prstGeom>
+        </p:spPr>
+        <p:style>
+          <a:lnRef idx="2">
+            <a:schemeClr val="accent1">
+              <a:shade val="50000"/>
+            </a:schemeClr>
+          </a:lnRef>
+          <a:fillRef idx="1">
+            <a:schemeClr val="accent1"/>
+          </a:fillRef>
+          <a:effectRef idx="0">
+            <a:schemeClr val="accent1"/>
+          </a:effectRef>
+          <a:fontRef idx="minor">
+            <a:schemeClr val="lt1"/>
+          </a:fontRef>
+        </p:style>
+        <p:txBody>
+          <a:bodyPr rtlCol="0" anchor="ctr"/>
+          <a:lstStyle/>
+          <a:p>
+            <a:pPr algn="ctr"/>
+            <a:endParaRPr lang="en-US"/>
+          </a:p>
+        </p:txBody>
+      </p:sp>
+    </p:spTree>
+    <p:extLst>
+      <p:ext uri="{BB962C8B-B14F-4D97-AF65-F5344CB8AC3E}">
+        <p14:creationId xmlns:p14="http://schemas.microsoft.com/office/powerpoint/2010/main" val="2273836676"/>
+      </p:ext>
+    </p:extLst>
+  </p:cSld>
+  <p:clrMapOvr>
+    <a:masterClrMapping/>
+  </p:clrMapOvr>
+</p:sld>
+</file>
+
 <file path=ppt/theme/theme1.xml><?xml version="1.0" encoding="utf-8"?>
 <a:theme xmlns:a="http://schemas.openxmlformats.org/drawingml/2006/main" name="Office Theme">
   <a:themeElements>

</xml_diff>